<commit_message>
Added Non-Functional Requirements to powerpoint
</commit_message>
<xml_diff>
--- a/Design Documents/PresentationSoftEng.pptx
+++ b/Design Documents/PresentationSoftEng.pptx
@@ -20,7 +20,8 @@
     <p:sldId id="268" r:id="rId14"/>
     <p:sldId id="272" r:id="rId15"/>
     <p:sldId id="269" r:id="rId16"/>
-    <p:sldId id="267" r:id="rId17"/>
+    <p:sldId id="273" r:id="rId17"/>
+    <p:sldId id="267" r:id="rId18"/>
   </p:sldIdLst>
   <p:sldSz cx="9144000" cy="6858000" type="screen4x3"/>
   <p:notesSz cx="6858000" cy="9144000"/>
@@ -5549,6 +5550,143 @@
 </file>
 
 <file path=ppt/slides/slide16.xml><?xml version="1.0" encoding="utf-8"?>
+<p:sld xmlns:a="http://schemas.openxmlformats.org/drawingml/2006/main" xmlns:r="http://schemas.openxmlformats.org/officeDocument/2006/relationships" xmlns:p="http://schemas.openxmlformats.org/presentationml/2006/main">
+  <p:cSld>
+    <p:spTree>
+      <p:nvGrpSpPr>
+        <p:cNvPr id="1" name=""/>
+        <p:cNvGrpSpPr/>
+        <p:nvPr/>
+      </p:nvGrpSpPr>
+      <p:grpSpPr>
+        <a:xfrm>
+          <a:off x="0" y="0"/>
+          <a:ext cx="0" cy="0"/>
+          <a:chOff x="0" y="0"/>
+          <a:chExt cx="0" cy="0"/>
+        </a:xfrm>
+      </p:grpSpPr>
+      <p:sp>
+        <p:nvSpPr>
+          <p:cNvPr id="2" name="Title 1"/>
+          <p:cNvSpPr>
+            <a:spLocks noGrp="1"/>
+          </p:cNvSpPr>
+          <p:nvPr>
+            <p:ph type="title"/>
+          </p:nvPr>
+        </p:nvSpPr>
+        <p:spPr>
+          <a:xfrm>
+            <a:off x="822960" y="759656"/>
+            <a:ext cx="7520940" cy="548640"/>
+          </a:xfrm>
+        </p:spPr>
+        <p:txBody>
+          <a:bodyPr/>
+          <a:lstStyle/>
+          <a:p>
+            <a:pPr algn="ctr"/>
+            <a:r>
+              <a:rPr lang="en-US" dirty="0"/>
+              <a:t>Non-Functional Requirements</a:t>
+            </a:r>
+            <a:br>
+              <a:rPr lang="en-US" dirty="0"/>
+            </a:br>
+            <a:endParaRPr lang="en-US" dirty="0"/>
+          </a:p>
+        </p:txBody>
+      </p:sp>
+      <p:sp>
+        <p:nvSpPr>
+          <p:cNvPr id="3" name="Content Placeholder 2"/>
+          <p:cNvSpPr>
+            <a:spLocks noGrp="1"/>
+          </p:cNvSpPr>
+          <p:nvPr>
+            <p:ph idx="1"/>
+          </p:nvPr>
+        </p:nvSpPr>
+        <p:spPr>
+          <a:xfrm>
+            <a:off x="822960" y="1677403"/>
+            <a:ext cx="7520940" cy="3579849"/>
+          </a:xfrm>
+        </p:spPr>
+        <p:txBody>
+          <a:bodyPr/>
+          <a:lstStyle/>
+          <a:p>
+            <a:r>
+              <a:rPr lang="en-US" dirty="0"/>
+              <a:t>·        8 letter username for users</a:t>
+            </a:r>
+          </a:p>
+          <a:p>
+            <a:r>
+              <a:rPr lang="en-US" dirty="0"/>
+              <a:t>·        At least 5 users able to be logged in to the system</a:t>
+            </a:r>
+          </a:p>
+          <a:p>
+            <a:r>
+              <a:rPr lang="en-US" dirty="0"/>
+              <a:t>·        Keep track of certain amount of orders</a:t>
+            </a:r>
+          </a:p>
+          <a:p>
+            <a:r>
+              <a:rPr lang="en-US" dirty="0"/>
+              <a:t>·        Supports popular browsers (IE, Chrome, Firefox)</a:t>
+            </a:r>
+          </a:p>
+          <a:p>
+            <a:r>
+              <a:rPr lang="en-US" dirty="0"/>
+              <a:t>·        Passwords (At least 1 Capital, 1 number, 8 characters)</a:t>
+            </a:r>
+          </a:p>
+          <a:p>
+            <a:r>
+              <a:rPr lang="en-US" dirty="0"/>
+              <a:t>·        Recovery options for Data</a:t>
+            </a:r>
+          </a:p>
+          <a:p>
+            <a:r>
+              <a:rPr lang="en-US" dirty="0"/>
+              <a:t>·        Maintenance</a:t>
+            </a:r>
+          </a:p>
+          <a:p>
+            <a:r>
+              <a:rPr lang="en-US" dirty="0"/>
+              <a:t>·        Hidden Items, separate database</a:t>
+            </a:r>
+          </a:p>
+          <a:p>
+            <a:r>
+              <a:rPr lang="en-US" dirty="0"/>
+              <a:t>·        Account Security (Usernames and Passwords)</a:t>
+            </a:r>
+          </a:p>
+        </p:txBody>
+      </p:sp>
+    </p:spTree>
+    <p:extLst>
+      <p:ext uri="{BB962C8B-B14F-4D97-AF65-F5344CB8AC3E}">
+        <p14:creationId xmlns:p14="http://schemas.microsoft.com/office/powerpoint/2010/main" val="3300354779"/>
+      </p:ext>
+    </p:extLst>
+  </p:cSld>
+  <p:clrMapOvr>
+    <a:masterClrMapping/>
+  </p:clrMapOvr>
+</p:sld>
+</file>
+
+<file path=ppt/slides/slide17.xml><?xml version="1.0" encoding="utf-8"?>
 <p:sld xmlns:a="http://schemas.openxmlformats.org/drawingml/2006/main" xmlns:r="http://schemas.openxmlformats.org/officeDocument/2006/relationships" xmlns:p="http://schemas.openxmlformats.org/presentationml/2006/main">
   <p:cSld>
     <p:spTree>

</xml_diff>

<commit_message>
another update to powerpoint
</commit_message>
<xml_diff>
--- a/Design Documents/PresentationSoftEng.pptx
+++ b/Design Documents/PresentationSoftEng.pptx
@@ -5214,25 +5214,6 @@
           </a:xfrm>
         </p:spPr>
       </p:pic>
-      <p:sp>
-        <p:nvSpPr>
-          <p:cNvPr id="6" name="Title 5"/>
-          <p:cNvSpPr>
-            <a:spLocks noGrp="1"/>
-          </p:cNvSpPr>
-          <p:nvPr>
-            <p:ph type="title"/>
-          </p:nvPr>
-        </p:nvSpPr>
-        <p:spPr/>
-        <p:txBody>
-          <a:bodyPr/>
-          <a:lstStyle/>
-          <a:p>
-            <a:endParaRPr lang="en-US"/>
-          </a:p>
-        </p:txBody>
-      </p:sp>
     </p:spTree>
     <p:extLst>
       <p:ext uri="{BB962C8B-B14F-4D97-AF65-F5344CB8AC3E}">
@@ -5376,25 +5357,6 @@
           <a:chExt cx="0" cy="0"/>
         </a:xfrm>
       </p:grpSpPr>
-      <p:sp>
-        <p:nvSpPr>
-          <p:cNvPr id="2" name="Title 1"/>
-          <p:cNvSpPr>
-            <a:spLocks noGrp="1"/>
-          </p:cNvSpPr>
-          <p:nvPr>
-            <p:ph type="title"/>
-          </p:nvPr>
-        </p:nvSpPr>
-        <p:spPr/>
-        <p:txBody>
-          <a:bodyPr/>
-          <a:lstStyle/>
-          <a:p>
-            <a:endParaRPr lang="en-US"/>
-          </a:p>
-        </p:txBody>
-      </p:sp>
       <p:pic>
         <p:nvPicPr>
           <p:cNvPr id="4" name="Content Placeholder 3"/>
@@ -5419,7 +5381,7 @@
         </p:blipFill>
         <p:spPr>
           <a:xfrm>
-            <a:off x="1036587" y="1294226"/>
+            <a:off x="1036587" y="984736"/>
             <a:ext cx="2269322" cy="2807409"/>
           </a:xfrm>
         </p:spPr>
@@ -5446,7 +5408,7 @@
         </p:blipFill>
         <p:spPr>
           <a:xfrm>
-            <a:off x="4276579" y="1145750"/>
+            <a:off x="4276579" y="790442"/>
             <a:ext cx="3123028" cy="3195996"/>
           </a:xfrm>
           <a:prstGeom prst="rect">
@@ -5610,7 +5572,7 @@
         </p:nvSpPr>
         <p:spPr>
           <a:xfrm>
-            <a:off x="822960" y="1677403"/>
+            <a:off x="822960" y="1592995"/>
             <a:ext cx="7520940" cy="3579849"/>
           </a:xfrm>
         </p:spPr>
@@ -5632,7 +5594,7 @@
           <a:p>
             <a:r>
               <a:rPr lang="en-US" dirty="0"/>
-              <a:t>·        Keep track of certain amount of orders</a:t>
+              <a:t>·        Keep track of concurrent and multiple orders</a:t>
             </a:r>
           </a:p>
           <a:p>
@@ -6094,26 +6056,6 @@
           <a:chExt cx="0" cy="0"/>
         </a:xfrm>
       </p:grpSpPr>
-      <p:sp>
-        <p:nvSpPr>
-          <p:cNvPr id="2" name="Title 1"/>
-          <p:cNvSpPr>
-            <a:spLocks noGrp="1"/>
-          </p:cNvSpPr>
-          <p:nvPr>
-            <p:ph type="title"/>
-          </p:nvPr>
-        </p:nvSpPr>
-        <p:spPr/>
-        <p:txBody>
-          <a:bodyPr/>
-          <a:lstStyle/>
-          <a:p>
-            <a:pPr algn="ctr"/>
-            <a:endParaRPr lang="en-US" dirty="0"/>
-          </a:p>
-        </p:txBody>
-      </p:sp>
       <p:pic>
         <p:nvPicPr>
           <p:cNvPr id="4" name="Content Placeholder 3" descr="_waitress.jpg"/>
@@ -6204,25 +6146,6 @@
           <a:chExt cx="0" cy="0"/>
         </a:xfrm>
       </p:grpSpPr>
-      <p:sp>
-        <p:nvSpPr>
-          <p:cNvPr id="2" name="Title 1"/>
-          <p:cNvSpPr>
-            <a:spLocks noGrp="1"/>
-          </p:cNvSpPr>
-          <p:nvPr>
-            <p:ph type="title"/>
-          </p:nvPr>
-        </p:nvSpPr>
-        <p:spPr/>
-        <p:txBody>
-          <a:bodyPr/>
-          <a:lstStyle/>
-          <a:p>
-            <a:endParaRPr lang="en-US" dirty="0"/>
-          </a:p>
-        </p:txBody>
-      </p:sp>
       <p:sp>
         <p:nvSpPr>
           <p:cNvPr id="3" name="Content Placeholder 2"/>
@@ -6363,7 +6286,7 @@
             <a:pPr algn="ctr"/>
             <a:r>
               <a:rPr lang="en-US" dirty="0"/>
-              <a:t>ALL The restaurants one APP</a:t>
+              <a:t>ALL restaurants one APP</a:t>
             </a:r>
           </a:p>
         </p:txBody>
@@ -6458,25 +6381,6 @@
           <a:chExt cx="0" cy="0"/>
         </a:xfrm>
       </p:grpSpPr>
-      <p:sp>
-        <p:nvSpPr>
-          <p:cNvPr id="2" name="Title 1"/>
-          <p:cNvSpPr>
-            <a:spLocks noGrp="1"/>
-          </p:cNvSpPr>
-          <p:nvPr>
-            <p:ph type="title"/>
-          </p:nvPr>
-        </p:nvSpPr>
-        <p:spPr/>
-        <p:txBody>
-          <a:bodyPr/>
-          <a:lstStyle/>
-          <a:p>
-            <a:endParaRPr lang="en-US"/>
-          </a:p>
-        </p:txBody>
-      </p:sp>
       <p:pic>
         <p:nvPicPr>
           <p:cNvPr id="4" name="Content Placeholder 3"/>
@@ -6536,25 +6440,6 @@
           <a:chExt cx="0" cy="0"/>
         </a:xfrm>
       </p:grpSpPr>
-      <p:sp>
-        <p:nvSpPr>
-          <p:cNvPr id="2" name="Title 1"/>
-          <p:cNvSpPr>
-            <a:spLocks noGrp="1"/>
-          </p:cNvSpPr>
-          <p:nvPr>
-            <p:ph type="title"/>
-          </p:nvPr>
-        </p:nvSpPr>
-        <p:spPr/>
-        <p:txBody>
-          <a:bodyPr/>
-          <a:lstStyle/>
-          <a:p>
-            <a:endParaRPr lang="en-US" dirty="0"/>
-          </a:p>
-        </p:txBody>
-      </p:sp>
       <p:pic>
         <p:nvPicPr>
           <p:cNvPr id="7" name="Content Placeholder 6"/>
@@ -6614,25 +6499,6 @@
           <a:chExt cx="0" cy="0"/>
         </a:xfrm>
       </p:grpSpPr>
-      <p:sp>
-        <p:nvSpPr>
-          <p:cNvPr id="2" name="Title 1"/>
-          <p:cNvSpPr>
-            <a:spLocks noGrp="1"/>
-          </p:cNvSpPr>
-          <p:nvPr>
-            <p:ph type="title"/>
-          </p:nvPr>
-        </p:nvSpPr>
-        <p:spPr/>
-        <p:txBody>
-          <a:bodyPr/>
-          <a:lstStyle/>
-          <a:p>
-            <a:endParaRPr lang="en-US"/>
-          </a:p>
-        </p:txBody>
-      </p:sp>
       <p:pic>
         <p:nvPicPr>
           <p:cNvPr id="4" name="Content Placeholder 3"/>
@@ -6657,7 +6523,7 @@
         </p:blipFill>
         <p:spPr>
           <a:xfrm>
-            <a:off x="822960" y="1033976"/>
+            <a:off x="696351" y="766690"/>
             <a:ext cx="2959675" cy="3341077"/>
           </a:xfrm>
         </p:spPr>
@@ -6684,7 +6550,7 @@
         </p:blipFill>
         <p:spPr>
           <a:xfrm>
-            <a:off x="4306473" y="640080"/>
+            <a:off x="4475285" y="288387"/>
             <a:ext cx="3390398" cy="3291840"/>
           </a:xfrm>
           <a:prstGeom prst="rect">

</xml_diff>